<commit_message>
Debugging ksb- printing out a bunch of stuff.
</commit_message>
<xml_diff>
--- a/plot/2014_06_10/2014_06_10 SB results.pptx
+++ b/plot/2014_06_10/2014_06_10 SB results.pptx
@@ -5,16 +5,15 @@
     <p:sldMasterId id="2147483648" r:id="rId1"/>
   </p:sldMasterIdLst>
   <p:sldIdLst>
-    <p:sldId id="256" r:id="rId2"/>
-    <p:sldId id="257" r:id="rId3"/>
-    <p:sldId id="258" r:id="rId4"/>
-    <p:sldId id="259" r:id="rId5"/>
-    <p:sldId id="260" r:id="rId6"/>
-    <p:sldId id="261" r:id="rId7"/>
-    <p:sldId id="262" r:id="rId8"/>
+    <p:sldId id="257" r:id="rId2"/>
+    <p:sldId id="258" r:id="rId3"/>
+    <p:sldId id="259" r:id="rId4"/>
+    <p:sldId id="260" r:id="rId5"/>
+    <p:sldId id="261" r:id="rId6"/>
+    <p:sldId id="262" r:id="rId7"/>
+    <p:sldId id="266" r:id="rId8"/>
     <p:sldId id="263" r:id="rId9"/>
     <p:sldId id="264" r:id="rId10"/>
-    <p:sldId id="265" r:id="rId11"/>
   </p:sldIdLst>
   <p:sldSz cx="9144000" cy="6858000" type="screen4x3"/>
   <p:notesSz cx="6858000" cy="9144000"/>
@@ -3111,142 +3110,6 @@
             <a:spLocks noGrp="1"/>
           </p:cNvSpPr>
           <p:nvPr>
-            <p:ph type="ctrTitle"/>
-          </p:nvPr>
-        </p:nvSpPr>
-        <p:spPr/>
-        <p:txBody>
-          <a:bodyPr/>
-          <a:lstStyle/>
-          <a:p>
-            <a:endParaRPr lang="en-US"/>
-          </a:p>
-        </p:txBody>
-      </p:sp>
-      <p:sp>
-        <p:nvSpPr>
-          <p:cNvPr id="3" name="Subtitle 2"/>
-          <p:cNvSpPr>
-            <a:spLocks noGrp="1"/>
-          </p:cNvSpPr>
-          <p:nvPr>
-            <p:ph type="subTitle" idx="1"/>
-          </p:nvPr>
-        </p:nvSpPr>
-        <p:spPr/>
-        <p:txBody>
-          <a:bodyPr/>
-          <a:lstStyle/>
-          <a:p>
-            <a:endParaRPr lang="en-US"/>
-          </a:p>
-        </p:txBody>
-      </p:sp>
-    </p:spTree>
-    <p:extLst>
-      <p:ext uri="{BB962C8B-B14F-4D97-AF65-F5344CB8AC3E}">
-        <p14:creationId xmlns:p14="http://schemas.microsoft.com/office/powerpoint/2010/main" val="3352832064"/>
-      </p:ext>
-    </p:extLst>
-  </p:cSld>
-  <p:clrMapOvr>
-    <a:masterClrMapping/>
-  </p:clrMapOvr>
-</p:sld>
-</file>
-
-<file path=ppt/slides/slide10.xml><?xml version="1.0" encoding="utf-8"?>
-<p:sld xmlns:a="http://schemas.openxmlformats.org/drawingml/2006/main" xmlns:r="http://schemas.openxmlformats.org/officeDocument/2006/relationships" xmlns:p="http://schemas.openxmlformats.org/presentationml/2006/main">
-  <p:cSld>
-    <p:spTree>
-      <p:nvGrpSpPr>
-        <p:cNvPr id="1" name=""/>
-        <p:cNvGrpSpPr/>
-        <p:nvPr/>
-      </p:nvGrpSpPr>
-      <p:grpSpPr>
-        <a:xfrm>
-          <a:off x="0" y="0"/>
-          <a:ext cx="0" cy="0"/>
-          <a:chOff x="0" y="0"/>
-          <a:chExt cx="0" cy="0"/>
-        </a:xfrm>
-      </p:grpSpPr>
-      <p:sp>
-        <p:nvSpPr>
-          <p:cNvPr id="2" name="Title 1"/>
-          <p:cNvSpPr>
-            <a:spLocks noGrp="1"/>
-          </p:cNvSpPr>
-          <p:nvPr>
-            <p:ph type="title"/>
-          </p:nvPr>
-        </p:nvSpPr>
-        <p:spPr/>
-        <p:txBody>
-          <a:bodyPr/>
-          <a:lstStyle/>
-          <a:p>
-            <a:endParaRPr lang="en-US"/>
-          </a:p>
-        </p:txBody>
-      </p:sp>
-      <p:sp>
-        <p:nvSpPr>
-          <p:cNvPr id="3" name="Content Placeholder 2"/>
-          <p:cNvSpPr>
-            <a:spLocks noGrp="1"/>
-          </p:cNvSpPr>
-          <p:nvPr>
-            <p:ph idx="1"/>
-          </p:nvPr>
-        </p:nvSpPr>
-        <p:spPr/>
-        <p:txBody>
-          <a:bodyPr/>
-          <a:lstStyle/>
-          <a:p>
-            <a:endParaRPr lang="en-US"/>
-          </a:p>
-        </p:txBody>
-      </p:sp>
-    </p:spTree>
-    <p:extLst>
-      <p:ext uri="{BB962C8B-B14F-4D97-AF65-F5344CB8AC3E}">
-        <p14:creationId xmlns:p14="http://schemas.microsoft.com/office/powerpoint/2010/main" val="3263648730"/>
-      </p:ext>
-    </p:extLst>
-  </p:cSld>
-  <p:clrMapOvr>
-    <a:masterClrMapping/>
-  </p:clrMapOvr>
-</p:sld>
-</file>
-
-<file path=ppt/slides/slide2.xml><?xml version="1.0" encoding="utf-8"?>
-<p:sld xmlns:a="http://schemas.openxmlformats.org/drawingml/2006/main" xmlns:r="http://schemas.openxmlformats.org/officeDocument/2006/relationships" xmlns:p="http://schemas.openxmlformats.org/presentationml/2006/main">
-  <p:cSld>
-    <p:spTree>
-      <p:nvGrpSpPr>
-        <p:cNvPr id="1" name=""/>
-        <p:cNvGrpSpPr/>
-        <p:nvPr/>
-      </p:nvGrpSpPr>
-      <p:grpSpPr>
-        <a:xfrm>
-          <a:off x="0" y="0"/>
-          <a:ext cx="0" cy="0"/>
-          <a:chOff x="0" y="0"/>
-          <a:chExt cx="0" cy="0"/>
-        </a:xfrm>
-      </p:grpSpPr>
-      <p:sp>
-        <p:nvSpPr>
-          <p:cNvPr id="2" name="Title 1"/>
-          <p:cNvSpPr>
-            <a:spLocks noGrp="1"/>
-          </p:cNvSpPr>
-          <p:nvPr>
             <p:ph type="title"/>
           </p:nvPr>
         </p:nvSpPr>
@@ -3320,7 +3183,7 @@
 </p:sld>
 </file>
 
-<file path=ppt/slides/slide3.xml><?xml version="1.0" encoding="utf-8"?>
+<file path=ppt/slides/slide2.xml><?xml version="1.0" encoding="utf-8"?>
 <p:sld xmlns:a="http://schemas.openxmlformats.org/drawingml/2006/main" xmlns:r="http://schemas.openxmlformats.org/officeDocument/2006/relationships" xmlns:p="http://schemas.openxmlformats.org/presentationml/2006/main">
   <p:cSld>
     <p:spTree>
@@ -3380,7 +3243,7 @@
 </p:sld>
 </file>
 
-<file path=ppt/slides/slide4.xml><?xml version="1.0" encoding="utf-8"?>
+<file path=ppt/slides/slide3.xml><?xml version="1.0" encoding="utf-8"?>
 <p:sld xmlns:a="http://schemas.openxmlformats.org/drawingml/2006/main" xmlns:r="http://schemas.openxmlformats.org/officeDocument/2006/relationships" xmlns:p="http://schemas.openxmlformats.org/presentationml/2006/main">
   <p:cSld>
     <p:spTree>
@@ -3440,7 +3303,7 @@
 </p:sld>
 </file>
 
-<file path=ppt/slides/slide5.xml><?xml version="1.0" encoding="utf-8"?>
+<file path=ppt/slides/slide4.xml><?xml version="1.0" encoding="utf-8"?>
 <p:sld xmlns:a="http://schemas.openxmlformats.org/drawingml/2006/main" xmlns:r="http://schemas.openxmlformats.org/officeDocument/2006/relationships" xmlns:p="http://schemas.openxmlformats.org/presentationml/2006/main">
   <p:cSld>
     <p:spTree>
@@ -3499,7 +3362,7 @@
 </p:sld>
 </file>
 
-<file path=ppt/slides/slide6.xml><?xml version="1.0" encoding="utf-8"?>
+<file path=ppt/slides/slide5.xml><?xml version="1.0" encoding="utf-8"?>
 <p:sld xmlns:a="http://schemas.openxmlformats.org/drawingml/2006/main" xmlns:r="http://schemas.openxmlformats.org/officeDocument/2006/relationships" xmlns:p="http://schemas.openxmlformats.org/presentationml/2006/main">
   <p:cSld>
     <p:spTree>
@@ -3558,7 +3421,7 @@
 </p:sld>
 </file>
 
-<file path=ppt/slides/slide7.xml><?xml version="1.0" encoding="utf-8"?>
+<file path=ppt/slides/slide6.xml><?xml version="1.0" encoding="utf-8"?>
 <p:sld xmlns:a="http://schemas.openxmlformats.org/drawingml/2006/main" xmlns:r="http://schemas.openxmlformats.org/officeDocument/2006/relationships" xmlns:p="http://schemas.openxmlformats.org/presentationml/2006/main">
   <p:cSld>
     <p:spTree>
@@ -3608,6 +3471,66 @@
     <p:extLst>
       <p:ext uri="{BB962C8B-B14F-4D97-AF65-F5344CB8AC3E}">
         <p14:creationId xmlns:p14="http://schemas.microsoft.com/office/powerpoint/2010/main" val="3613112934"/>
+      </p:ext>
+    </p:extLst>
+  </p:cSld>
+  <p:clrMapOvr>
+    <a:masterClrMapping/>
+  </p:clrMapOvr>
+</p:sld>
+</file>
+
+<file path=ppt/slides/slide7.xml><?xml version="1.0" encoding="utf-8"?>
+<p:sld xmlns:a="http://schemas.openxmlformats.org/drawingml/2006/main" xmlns:r="http://schemas.openxmlformats.org/officeDocument/2006/relationships" xmlns:p="http://schemas.openxmlformats.org/presentationml/2006/main">
+  <p:cSld>
+    <p:spTree>
+      <p:nvGrpSpPr>
+        <p:cNvPr id="1" name=""/>
+        <p:cNvGrpSpPr/>
+        <p:nvPr/>
+      </p:nvGrpSpPr>
+      <p:grpSpPr>
+        <a:xfrm>
+          <a:off x="0" y="0"/>
+          <a:ext cx="0" cy="0"/>
+          <a:chOff x="0" y="0"/>
+          <a:chExt cx="0" cy="0"/>
+        </a:xfrm>
+      </p:grpSpPr>
+      <p:pic>
+        <p:nvPicPr>
+          <p:cNvPr id="4" name="Content Placeholder 3" descr="asia_SHD.eps"/>
+          <p:cNvPicPr>
+            <a:picLocks noGrp="1" noChangeAspect="1"/>
+          </p:cNvPicPr>
+          <p:nvPr>
+            <p:ph idx="1"/>
+          </p:nvPr>
+        </p:nvPicPr>
+        <p:blipFill>
+          <a:blip r:embed="rId2">
+            <a:extLst>
+              <a:ext uri="{28A0092B-C50C-407E-A947-70E740481C1C}">
+                <a14:useLocalDpi xmlns:a14="http://schemas.microsoft.com/office/drawing/2010/main" val="0"/>
+              </a:ext>
+            </a:extLst>
+          </a:blip>
+          <a:srcRect l="-5778" r="-5778"/>
+          <a:stretch>
+            <a:fillRect/>
+          </a:stretch>
+        </p:blipFill>
+        <p:spPr>
+          <a:xfrm>
+            <a:off x="-861857" y="239561"/>
+            <a:ext cx="10994023" cy="6046289"/>
+          </a:xfrm>
+        </p:spPr>
+      </p:pic>
+    </p:spTree>
+    <p:extLst>
+      <p:ext uri="{BB962C8B-B14F-4D97-AF65-F5344CB8AC3E}">
+        <p14:creationId xmlns:p14="http://schemas.microsoft.com/office/powerpoint/2010/main" val="2893329588"/>
       </p:ext>
     </p:extLst>
   </p:cSld>

</xml_diff>